<commit_message>
Add Compute, Infrastructure + changes to DevOps
</commit_message>
<xml_diff>
--- a/Presentations/2018-01-NYC/Opening-70-535-Certification-JumpStart-Q&A.pptx
+++ b/Presentations/2018-01-NYC/Opening-70-535-Certification-JumpStart-Q&A.pptx
@@ -265,7 +265,7 @@
           <a:p>
             <a:fld id="{17A87663-80B2-406A-AEA6-02F380A944CC}" type="datetimeFigureOut">
               <a:rPr lang="en-US" smtClean="0"/>
-              <a:t>1/8/2018</a:t>
+              <a:t>1/15/2018</a:t>
             </a:fld>
             <a:endParaRPr lang="en-US"/>
           </a:p>
@@ -2447,7 +2447,7 @@
                 <a:tabLst/>
                 <a:defRPr/>
               </a:pPr>
-              <a:t>1/8/2018</a:t>
+              <a:t>1/15/2018</a:t>
             </a:fld>
             <a:endParaRPr kumimoji="0" lang="en-US" sz="1200" b="0" i="0" u="none" strike="noStrike" kern="1200" cap="none" spc="0" normalizeH="0" baseline="0" noProof="0" dirty="0">
               <a:ln>
@@ -3025,7 +3025,7 @@
           <a:p>
             <a:fld id="{C093B9F9-3668-4248-BC3B-A7F41B8EEB64}" type="datetimeFigureOut">
               <a:rPr lang="en-US" smtClean="0"/>
-              <a:t>1/8/2018</a:t>
+              <a:t>1/15/2018</a:t>
             </a:fld>
             <a:endParaRPr lang="en-US"/>
           </a:p>
@@ -3193,7 +3193,7 @@
           <a:p>
             <a:fld id="{C093B9F9-3668-4248-BC3B-A7F41B8EEB64}" type="datetimeFigureOut">
               <a:rPr lang="en-US" smtClean="0"/>
-              <a:t>1/8/2018</a:t>
+              <a:t>1/15/2018</a:t>
             </a:fld>
             <a:endParaRPr lang="en-US"/>
           </a:p>
@@ -3371,7 +3371,7 @@
           <a:p>
             <a:fld id="{C093B9F9-3668-4248-BC3B-A7F41B8EEB64}" type="datetimeFigureOut">
               <a:rPr lang="en-US" smtClean="0"/>
-              <a:t>1/8/2018</a:t>
+              <a:t>1/15/2018</a:t>
             </a:fld>
             <a:endParaRPr lang="en-US"/>
           </a:p>
@@ -5740,7 +5740,7 @@
           <a:p>
             <a:fld id="{C093B9F9-3668-4248-BC3B-A7F41B8EEB64}" type="datetimeFigureOut">
               <a:rPr lang="en-US" smtClean="0"/>
-              <a:t>1/8/2018</a:t>
+              <a:t>1/15/2018</a:t>
             </a:fld>
             <a:endParaRPr lang="en-US"/>
           </a:p>
@@ -5908,7 +5908,7 @@
           <a:p>
             <a:fld id="{C093B9F9-3668-4248-BC3B-A7F41B8EEB64}" type="datetimeFigureOut">
               <a:rPr lang="en-US" smtClean="0"/>
-              <a:t>1/8/2018</a:t>
+              <a:t>1/15/2018</a:t>
             </a:fld>
             <a:endParaRPr lang="en-US"/>
           </a:p>
@@ -6153,7 +6153,7 @@
           <a:p>
             <a:fld id="{C093B9F9-3668-4248-BC3B-A7F41B8EEB64}" type="datetimeFigureOut">
               <a:rPr lang="en-US" smtClean="0"/>
-              <a:t>1/8/2018</a:t>
+              <a:t>1/15/2018</a:t>
             </a:fld>
             <a:endParaRPr lang="en-US"/>
           </a:p>
@@ -6382,7 +6382,7 @@
           <a:p>
             <a:fld id="{C093B9F9-3668-4248-BC3B-A7F41B8EEB64}" type="datetimeFigureOut">
               <a:rPr lang="en-US" smtClean="0"/>
-              <a:t>1/8/2018</a:t>
+              <a:t>1/15/2018</a:t>
             </a:fld>
             <a:endParaRPr lang="en-US"/>
           </a:p>
@@ -6746,7 +6746,7 @@
           <a:p>
             <a:fld id="{C093B9F9-3668-4248-BC3B-A7F41B8EEB64}" type="datetimeFigureOut">
               <a:rPr lang="en-US" smtClean="0"/>
-              <a:t>1/8/2018</a:t>
+              <a:t>1/15/2018</a:t>
             </a:fld>
             <a:endParaRPr lang="en-US"/>
           </a:p>
@@ -6863,7 +6863,7 @@
           <a:p>
             <a:fld id="{C093B9F9-3668-4248-BC3B-A7F41B8EEB64}" type="datetimeFigureOut">
               <a:rPr lang="en-US" smtClean="0"/>
-              <a:t>1/8/2018</a:t>
+              <a:t>1/15/2018</a:t>
             </a:fld>
             <a:endParaRPr lang="en-US"/>
           </a:p>
@@ -6958,7 +6958,7 @@
           <a:p>
             <a:fld id="{C093B9F9-3668-4248-BC3B-A7F41B8EEB64}" type="datetimeFigureOut">
               <a:rPr lang="en-US" smtClean="0"/>
-              <a:t>1/8/2018</a:t>
+              <a:t>1/15/2018</a:t>
             </a:fld>
             <a:endParaRPr lang="en-US"/>
           </a:p>
@@ -7233,7 +7233,7 @@
           <a:p>
             <a:fld id="{C093B9F9-3668-4248-BC3B-A7F41B8EEB64}" type="datetimeFigureOut">
               <a:rPr lang="en-US" smtClean="0"/>
-              <a:t>1/8/2018</a:t>
+              <a:t>1/15/2018</a:t>
             </a:fld>
             <a:endParaRPr lang="en-US"/>
           </a:p>
@@ -7485,7 +7485,7 @@
           <a:p>
             <a:fld id="{C093B9F9-3668-4248-BC3B-A7F41B8EEB64}" type="datetimeFigureOut">
               <a:rPr lang="en-US" smtClean="0"/>
-              <a:t>1/8/2018</a:t>
+              <a:t>1/15/2018</a:t>
             </a:fld>
             <a:endParaRPr lang="en-US"/>
           </a:p>
@@ -7696,7 +7696,7 @@
           <a:p>
             <a:fld id="{C093B9F9-3668-4248-BC3B-A7F41B8EEB64}" type="datetimeFigureOut">
               <a:rPr lang="en-US" smtClean="0"/>
-              <a:t>1/8/2018</a:t>
+              <a:t>1/15/2018</a:t>
             </a:fld>
             <a:endParaRPr lang="en-US"/>
           </a:p>
@@ -8285,7 +8285,7 @@
                 <a:tabLst/>
                 <a:defRPr/>
               </a:pPr>
-              <a:t>1/8/2018</a:t>
+              <a:t>1/15/2018</a:t>
             </a:fld>
             <a:endParaRPr kumimoji="0" lang="en-US" sz="1200" b="0" i="0" u="none" strike="noStrike" kern="1200" cap="none" spc="0" normalizeH="0" baseline="0" noProof="0" dirty="0">
               <a:ln>
@@ -10528,7 +10528,7 @@
 </file>
 
 <file path=ppt/slides/slide14.xml><?xml version="1.0" encoding="utf-8"?>
-<p:sld xmlns:a="http://schemas.openxmlformats.org/drawingml/2006/main" xmlns:r="http://schemas.openxmlformats.org/officeDocument/2006/relationships" xmlns:p="http://schemas.openxmlformats.org/presentationml/2006/main">
+<p:sld xmlns:a="http://schemas.openxmlformats.org/drawingml/2006/main" xmlns:r="http://schemas.openxmlformats.org/officeDocument/2006/relationships" xmlns:p="http://schemas.openxmlformats.org/presentationml/2006/main" show="0">
   <p:cSld>
     <p:spTree>
       <p:nvGrpSpPr>
@@ -10860,7 +10860,7 @@
         </p:nvGraphicFramePr>
         <p:xfrm>
           <a:off x="63420" y="1100661"/>
-          <a:ext cx="5894831" cy="4905240"/>
+          <a:ext cx="5894831" cy="4877046"/>
         </p:xfrm>
         <a:graphic>
           <a:graphicData uri="http://schemas.openxmlformats.org/drawingml/2006/table">
@@ -12199,7 +12199,7 @@
         </p:nvGraphicFramePr>
         <p:xfrm>
           <a:off x="5958251" y="1100661"/>
-          <a:ext cx="6267725" cy="4592686"/>
+          <a:ext cx="6267725" cy="4520440"/>
         </p:xfrm>
         <a:graphic>
           <a:graphicData uri="http://schemas.openxmlformats.org/drawingml/2006/table">

</xml_diff>